<commit_message>
DATA MINING - ottimizzazione
</commit_message>
<xml_diff>
--- a/Task2/Documentation/Data Mining/Presentazione Data Mining.pptx
+++ b/Task2/Documentation/Data Mining/Presentazione Data Mining.pptx
@@ -133,6 +133,9 @@
           </p14:sldIdLst>
         </p14:section>
       </p14:sectionLst>
+    </p:ext>
+    <p:ext uri="{EFAFB233-063F-42B5-8137-9DF3F51BA10A}">
+      <p15:sldGuideLst xmlns:p15="http://schemas.microsoft.com/office/powerpoint/2012/main"/>
     </p:ext>
   </p:extLst>
 </p:presentation>
@@ -1442,7 +1445,7 @@
       </dgm:spPr>
       <dgm:extLst>
         <a:ext uri="{E40237B7-FDA0-4F09-8148-C483321AD2D9}">
-          <dgm14:cNvPr xmlns:dgm14="http://schemas.microsoft.com/office/drawing/2010/diagram" id="0" name="" descr="Virgolette"/>
+          <dgm14:cNvPr xmlns:dgm14="http://schemas.microsoft.com/office/drawing/2010/diagram" id="0" name="" descr="Monete"/>
         </a:ext>
       </dgm:extLst>
     </dgm:pt>
@@ -3964,7 +3967,7 @@
           <a:p>
             <a:fld id="{5CB90554-A8B4-4174-A341-6094283FA27B}" type="datetimeFigureOut">
               <a:rPr lang="en-US" smtClean="0"/>
-              <a:t>1/27/2020</a:t>
+              <a:t>1/28/2020</a:t>
             </a:fld>
             <a:endParaRPr lang="en-US"/>
           </a:p>
@@ -4141,7 +4144,7 @@
           <a:p>
             <a:fld id="{9517E825-EC94-4DD7-99F2-91ECD6BB0169}" type="datetimeFigureOut">
               <a:rPr lang="en-US" smtClean="0"/>
-              <a:t>1/27/2020</a:t>
+              <a:t>1/28/2020</a:t>
             </a:fld>
             <a:endParaRPr lang="en-US"/>
           </a:p>
@@ -4540,7 +4543,7 @@
           <a:p>
             <a:fld id="{02AC24A9-CCB6-4F8D-B8DB-C2F3692CFA5A}" type="datetimeFigureOut">
               <a:rPr lang="en-US" smtClean="0"/>
-              <a:t>1/27/2020</a:t>
+              <a:t>1/28/2020</a:t>
             </a:fld>
             <a:endParaRPr lang="en-US"/>
           </a:p>
@@ -4710,7 +4713,7 @@
           <a:p>
             <a:fld id="{02AC24A9-CCB6-4F8D-B8DB-C2F3692CFA5A}" type="datetimeFigureOut">
               <a:rPr lang="en-US" smtClean="0"/>
-              <a:t>1/27/2020</a:t>
+              <a:t>1/28/2020</a:t>
             </a:fld>
             <a:endParaRPr lang="en-US"/>
           </a:p>
@@ -4890,7 +4893,7 @@
           <a:p>
             <a:fld id="{02AC24A9-CCB6-4F8D-B8DB-C2F3692CFA5A}" type="datetimeFigureOut">
               <a:rPr lang="en-US" smtClean="0"/>
-              <a:t>1/27/2020</a:t>
+              <a:t>1/28/2020</a:t>
             </a:fld>
             <a:endParaRPr lang="en-US"/>
           </a:p>
@@ -5060,7 +5063,7 @@
           <a:p>
             <a:fld id="{02AC24A9-CCB6-4F8D-B8DB-C2F3692CFA5A}" type="datetimeFigureOut">
               <a:rPr lang="en-US" smtClean="0"/>
-              <a:t>1/27/2020</a:t>
+              <a:t>1/28/2020</a:t>
             </a:fld>
             <a:endParaRPr lang="en-US"/>
           </a:p>
@@ -5306,7 +5309,7 @@
           <a:p>
             <a:fld id="{02AC24A9-CCB6-4F8D-B8DB-C2F3692CFA5A}" type="datetimeFigureOut">
               <a:rPr lang="en-US" smtClean="0"/>
-              <a:t>1/27/2020</a:t>
+              <a:t>1/28/2020</a:t>
             </a:fld>
             <a:endParaRPr lang="en-US"/>
           </a:p>
@@ -5538,7 +5541,7 @@
           <a:p>
             <a:fld id="{02AC24A9-CCB6-4F8D-B8DB-C2F3692CFA5A}" type="datetimeFigureOut">
               <a:rPr lang="en-US" smtClean="0"/>
-              <a:t>1/27/2020</a:t>
+              <a:t>1/28/2020</a:t>
             </a:fld>
             <a:endParaRPr lang="en-US"/>
           </a:p>
@@ -5905,7 +5908,7 @@
           <a:p>
             <a:fld id="{02AC24A9-CCB6-4F8D-B8DB-C2F3692CFA5A}" type="datetimeFigureOut">
               <a:rPr lang="en-US" smtClean="0"/>
-              <a:t>1/27/2020</a:t>
+              <a:t>1/28/2020</a:t>
             </a:fld>
             <a:endParaRPr lang="en-US"/>
           </a:p>
@@ -6023,7 +6026,7 @@
           <a:p>
             <a:fld id="{02AC24A9-CCB6-4F8D-B8DB-C2F3692CFA5A}" type="datetimeFigureOut">
               <a:rPr lang="en-US" smtClean="0"/>
-              <a:t>1/27/2020</a:t>
+              <a:t>1/28/2020</a:t>
             </a:fld>
             <a:endParaRPr lang="en-US"/>
           </a:p>
@@ -6118,7 +6121,7 @@
           <a:p>
             <a:fld id="{02AC24A9-CCB6-4F8D-B8DB-C2F3692CFA5A}" type="datetimeFigureOut">
               <a:rPr lang="en-US" smtClean="0"/>
-              <a:t>1/27/2020</a:t>
+              <a:t>1/28/2020</a:t>
             </a:fld>
             <a:endParaRPr lang="en-US"/>
           </a:p>
@@ -6395,7 +6398,7 @@
           <a:p>
             <a:fld id="{02AC24A9-CCB6-4F8D-B8DB-C2F3692CFA5A}" type="datetimeFigureOut">
               <a:rPr lang="en-US" smtClean="0"/>
-              <a:t>1/27/2020</a:t>
+              <a:t>1/28/2020</a:t>
             </a:fld>
             <a:endParaRPr lang="en-US"/>
           </a:p>
@@ -6652,7 +6655,7 @@
           <a:p>
             <a:fld id="{02AC24A9-CCB6-4F8D-B8DB-C2F3692CFA5A}" type="datetimeFigureOut">
               <a:rPr lang="en-US" smtClean="0"/>
-              <a:t>1/27/2020</a:t>
+              <a:t>1/28/2020</a:t>
             </a:fld>
             <a:endParaRPr lang="en-US"/>
           </a:p>
@@ -6865,7 +6868,7 @@
           <a:p>
             <a:fld id="{02AC24A9-CCB6-4F8D-B8DB-C2F3692CFA5A}" type="datetimeFigureOut">
               <a:rPr lang="en-US" smtClean="0"/>
-              <a:t>1/27/2020</a:t>
+              <a:t>1/28/2020</a:t>
             </a:fld>
             <a:endParaRPr lang="en-US"/>
           </a:p>
@@ -8323,7 +8326,7 @@
             <p:ph idx="1"/>
             <p:extLst>
               <p:ext uri="{D42A27DB-BD31-4B8C-83A1-F6EECF244321}">
-                <p14:modId xmlns:p14="http://schemas.microsoft.com/office/powerpoint/2010/main" val="798644532"/>
+                <p14:modId xmlns:p14="http://schemas.microsoft.com/office/powerpoint/2010/main" val="1842375044"/>
               </p:ext>
             </p:extLst>
           </p:nvPr>
@@ -8438,7 +8441,7 @@
       </p:sp>
       <p:pic>
         <p:nvPicPr>
-          <p:cNvPr id="7" name="Graphic 6">
+          <p:cNvPr id="7" name="Graphic 6" descr="Monete">
             <a:extLst>
               <a:ext uri="{FF2B5EF4-FFF2-40B4-BE49-F238E27FC236}">
                 <a16:creationId xmlns:a16="http://schemas.microsoft.com/office/drawing/2014/main" id="{15F4E7A6-0F5F-44F6-ADD1-7AF8F5355C3B}"/>
@@ -8461,9 +8464,8 @@
               </a:ext>
             </a:extLst>
           </a:blip>
-          <a:stretch>
-            <a:fillRect/>
-          </a:stretch>
+          <a:srcRect/>
+          <a:stretch/>
         </p:blipFill>
         <p:spPr>
           <a:xfrm>
@@ -8704,13 +8706,8 @@
             </a:pPr>
             <a:r>
               <a:rPr lang="it-IT" dirty="0"/>
-              <a:t>A causa del numero eccessivo di features prodotte dai passi precedenti si rende necessario l’utilizzo di una tecnica di riduzione della </a:t>
-            </a:r>
-            <a:r>
-              <a:rPr lang="it-IT" dirty="0" err="1"/>
-              <a:t>simensionalità</a:t>
-            </a:r>
-            <a:endParaRPr lang="it-IT" dirty="0"/>
+              <a:t>Il modo più semplice di gestire un gran numero di documenti contemporaneamente su un calcolatore modesto (come quello a mia disposizione) è quella di effettuare una riduzione della dimensionali </a:t>
+            </a:r>
           </a:p>
           <a:p>
             <a:pPr marL="0" indent="0">

</xml_diff>